<commit_message>
presentation 01 almost finished
</commit_message>
<xml_diff>
--- a/Other/Presentation/Presentation 01.pptx
+++ b/Other/Presentation/Presentation 01.pptx
@@ -5,7 +5,7 @@
     <p:sldMasterId id="2147483777" r:id="rId1"/>
   </p:sldMasterIdLst>
   <p:notesMasterIdLst>
-    <p:notesMasterId r:id="rId21"/>
+    <p:notesMasterId r:id="rId25"/>
   </p:notesMasterIdLst>
   <p:sldIdLst>
     <p:sldId id="256" r:id="rId2"/>
@@ -26,7 +26,11 @@
     <p:sldId id="278" r:id="rId17"/>
     <p:sldId id="275" r:id="rId18"/>
     <p:sldId id="276" r:id="rId19"/>
-    <p:sldId id="277" r:id="rId20"/>
+    <p:sldId id="279" r:id="rId20"/>
+    <p:sldId id="280" r:id="rId21"/>
+    <p:sldId id="281" r:id="rId22"/>
+    <p:sldId id="277" r:id="rId23"/>
+    <p:sldId id="282" r:id="rId24"/>
   </p:sldIdLst>
   <p:sldSz cx="12192000" cy="6858000"/>
   <p:notesSz cx="6858000" cy="9144000"/>
@@ -5007,8 +5011,15 @@
           <a:p>
             <a:pPr algn="ctr"/>
             <a:r>
-              <a:rPr lang="en-US" dirty="0"/>
+              <a:rPr lang="en-US" sz="2000" dirty="0"/>
               <a:t>“Modeling Environment”</a:t>
+            </a:r>
+          </a:p>
+          <a:p>
+            <a:pPr algn="ctr"/>
+            <a:r>
+              <a:rPr lang="en-US" sz="1400" dirty="0"/>
+              <a:t>Sep 06, 2022</a:t>
             </a:r>
           </a:p>
         </p:txBody>
@@ -9231,8 +9242,8 @@
         </p:nvSpPr>
         <p:spPr>
           <a:xfrm>
-            <a:off x="2197730" y="2052116"/>
-            <a:ext cx="7958330" cy="3997828"/>
+            <a:off x="2197730" y="1927829"/>
+            <a:ext cx="7958330" cy="2848358"/>
           </a:xfrm>
         </p:spPr>
         <p:txBody>
@@ -9381,6 +9392,326 @@
               <a:t>14</a:t>
             </a:fld>
             <a:endParaRPr lang="en-US"/>
+          </a:p>
+        </p:txBody>
+      </p:sp>
+      <p:sp>
+        <p:nvSpPr>
+          <p:cNvPr id="5" name="Content Placeholder 2">
+            <a:extLst>
+              <a:ext uri="{FF2B5EF4-FFF2-40B4-BE49-F238E27FC236}">
+                <a16:creationId xmlns:a16="http://schemas.microsoft.com/office/drawing/2014/main" id="{E1BE3CC1-8FDB-D50D-339B-AB5E306F8FA1}"/>
+              </a:ext>
+            </a:extLst>
+          </p:cNvPr>
+          <p:cNvSpPr txBox="1">
+            <a:spLocks/>
+          </p:cNvSpPr>
+          <p:nvPr/>
+        </p:nvSpPr>
+        <p:spPr>
+          <a:xfrm>
+            <a:off x="2350130" y="4366041"/>
+            <a:ext cx="7958330" cy="1683903"/>
+          </a:xfrm>
+          <a:prstGeom prst="rect">
+            <a:avLst/>
+          </a:prstGeom>
+        </p:spPr>
+        <p:txBody>
+          <a:bodyPr vert="horz" lIns="91440" tIns="45720" rIns="91440" bIns="45720" rtlCol="0" anchor="ctr">
+            <a:normAutofit/>
+          </a:bodyPr>
+          <a:lstStyle>
+            <a:lvl1pPr marL="344488" indent="-344488" algn="l" defTabSz="914400" rtl="0" eaLnBrk="1" latinLnBrk="0" hangingPunct="1">
+              <a:lnSpc>
+                <a:spcPct val="120000"/>
+              </a:lnSpc>
+              <a:spcBef>
+                <a:spcPts val="1000"/>
+              </a:spcBef>
+              <a:spcAft>
+                <a:spcPts val="600"/>
+              </a:spcAft>
+              <a:buClr>
+                <a:schemeClr val="accent6"/>
+              </a:buClr>
+              <a:buSzPct val="90000"/>
+              <a:buFont typeface="Wingdings" panose="05000000000000000000" pitchFamily="2" charset="2"/>
+              <a:buChar char="§"/>
+              <a:defRPr sz="2000" kern="1200">
+                <a:solidFill>
+                  <a:schemeClr val="tx1"/>
+                </a:solidFill>
+                <a:effectLst/>
+                <a:latin typeface="+mn-lt"/>
+                <a:ea typeface="+mn-ea"/>
+                <a:cs typeface="+mn-cs"/>
+              </a:defRPr>
+            </a:lvl1pPr>
+            <a:lvl2pPr marL="795338" indent="-338138" algn="l" defTabSz="914400" rtl="0" eaLnBrk="1" latinLnBrk="0" hangingPunct="1">
+              <a:lnSpc>
+                <a:spcPct val="120000"/>
+              </a:lnSpc>
+              <a:spcBef>
+                <a:spcPts val="500"/>
+              </a:spcBef>
+              <a:spcAft>
+                <a:spcPts val="600"/>
+              </a:spcAft>
+              <a:buClr>
+                <a:schemeClr val="accent6"/>
+              </a:buClr>
+              <a:buSzPct val="90000"/>
+              <a:buFont typeface="Wingdings" panose="05000000000000000000" pitchFamily="2" charset="2"/>
+              <a:buChar char="§"/>
+              <a:defRPr sz="1800" kern="1200">
+                <a:solidFill>
+                  <a:schemeClr val="tx1"/>
+                </a:solidFill>
+                <a:effectLst/>
+                <a:latin typeface="+mn-lt"/>
+                <a:ea typeface="+mn-ea"/>
+                <a:cs typeface="+mn-cs"/>
+              </a:defRPr>
+            </a:lvl2pPr>
+            <a:lvl3pPr marL="1258888" indent="-344488" algn="l" defTabSz="914400" rtl="0" eaLnBrk="1" latinLnBrk="0" hangingPunct="1">
+              <a:lnSpc>
+                <a:spcPct val="120000"/>
+              </a:lnSpc>
+              <a:spcBef>
+                <a:spcPts val="500"/>
+              </a:spcBef>
+              <a:spcAft>
+                <a:spcPts val="600"/>
+              </a:spcAft>
+              <a:buClr>
+                <a:schemeClr val="accent6"/>
+              </a:buClr>
+              <a:buSzPct val="90000"/>
+              <a:buFont typeface="Wingdings" panose="05000000000000000000" pitchFamily="2" charset="2"/>
+              <a:buChar char="§"/>
+              <a:defRPr sz="1600" kern="1200">
+                <a:solidFill>
+                  <a:schemeClr val="tx1"/>
+                </a:solidFill>
+                <a:effectLst/>
+                <a:latin typeface="+mn-lt"/>
+                <a:ea typeface="+mn-ea"/>
+                <a:cs typeface="+mn-cs"/>
+              </a:defRPr>
+            </a:lvl3pPr>
+            <a:lvl4pPr marL="1709738" indent="-338138" algn="l" defTabSz="914400" rtl="0" eaLnBrk="1" latinLnBrk="0" hangingPunct="1">
+              <a:lnSpc>
+                <a:spcPct val="120000"/>
+              </a:lnSpc>
+              <a:spcBef>
+                <a:spcPts val="500"/>
+              </a:spcBef>
+              <a:spcAft>
+                <a:spcPts val="600"/>
+              </a:spcAft>
+              <a:buClr>
+                <a:schemeClr val="accent6"/>
+              </a:buClr>
+              <a:buSzPct val="90000"/>
+              <a:buFont typeface="Wingdings" panose="05000000000000000000" pitchFamily="2" charset="2"/>
+              <a:buChar char="§"/>
+              <a:defRPr sz="1400" kern="1200">
+                <a:solidFill>
+                  <a:schemeClr val="tx1"/>
+                </a:solidFill>
+                <a:effectLst/>
+                <a:latin typeface="+mn-lt"/>
+                <a:ea typeface="+mn-ea"/>
+                <a:cs typeface="+mn-cs"/>
+              </a:defRPr>
+            </a:lvl4pPr>
+            <a:lvl5pPr marL="2173288" indent="-344488" algn="l" defTabSz="914400" rtl="0" eaLnBrk="1" latinLnBrk="0" hangingPunct="1">
+              <a:lnSpc>
+                <a:spcPct val="120000"/>
+              </a:lnSpc>
+              <a:spcBef>
+                <a:spcPts val="500"/>
+              </a:spcBef>
+              <a:spcAft>
+                <a:spcPts val="600"/>
+              </a:spcAft>
+              <a:buClr>
+                <a:schemeClr val="accent6"/>
+              </a:buClr>
+              <a:buSzPct val="90000"/>
+              <a:buFont typeface="Wingdings" panose="05000000000000000000" pitchFamily="2" charset="2"/>
+              <a:buChar char="§"/>
+              <a:defRPr sz="1200" kern="1200">
+                <a:solidFill>
+                  <a:schemeClr val="tx1"/>
+                </a:solidFill>
+                <a:effectLst/>
+                <a:latin typeface="+mn-lt"/>
+                <a:ea typeface="+mn-ea"/>
+                <a:cs typeface="+mn-cs"/>
+              </a:defRPr>
+            </a:lvl5pPr>
+            <a:lvl6pPr marL="2642616" indent="-338328" algn="l" defTabSz="914400" rtl="0" eaLnBrk="1" latinLnBrk="0" hangingPunct="1">
+              <a:lnSpc>
+                <a:spcPct val="120000"/>
+              </a:lnSpc>
+              <a:spcBef>
+                <a:spcPts val="500"/>
+              </a:spcBef>
+              <a:spcAft>
+                <a:spcPts val="600"/>
+              </a:spcAft>
+              <a:buClr>
+                <a:schemeClr val="accent6"/>
+              </a:buClr>
+              <a:buSzPct val="90000"/>
+              <a:buFont typeface="Wingdings" panose="05000000000000000000" pitchFamily="2" charset="2"/>
+              <a:buChar char="§"/>
+              <a:defRPr sz="1200" kern="1200" baseline="0">
+                <a:solidFill>
+                  <a:schemeClr val="tx1"/>
+                </a:solidFill>
+                <a:effectLst/>
+                <a:latin typeface="+mn-lt"/>
+                <a:ea typeface="+mn-ea"/>
+                <a:cs typeface="+mn-cs"/>
+              </a:defRPr>
+            </a:lvl6pPr>
+            <a:lvl7pPr marL="3108960" indent="-338328" algn="l" defTabSz="914400" rtl="0" eaLnBrk="1" latinLnBrk="0" hangingPunct="1">
+              <a:lnSpc>
+                <a:spcPct val="120000"/>
+              </a:lnSpc>
+              <a:spcBef>
+                <a:spcPts val="500"/>
+              </a:spcBef>
+              <a:spcAft>
+                <a:spcPts val="600"/>
+              </a:spcAft>
+              <a:buClr>
+                <a:schemeClr val="accent6"/>
+              </a:buClr>
+              <a:buSzPct val="90000"/>
+              <a:buFont typeface="Wingdings" panose="05000000000000000000" pitchFamily="2" charset="2"/>
+              <a:buChar char="§"/>
+              <a:defRPr sz="1200" kern="1200" baseline="0">
+                <a:solidFill>
+                  <a:schemeClr val="tx1"/>
+                </a:solidFill>
+                <a:effectLst/>
+                <a:latin typeface="+mn-lt"/>
+                <a:ea typeface="+mn-ea"/>
+                <a:cs typeface="+mn-cs"/>
+              </a:defRPr>
+            </a:lvl7pPr>
+            <a:lvl8pPr marL="3575304" indent="-338328" algn="l" defTabSz="914400" rtl="0" eaLnBrk="1" latinLnBrk="0" hangingPunct="1">
+              <a:lnSpc>
+                <a:spcPct val="120000"/>
+              </a:lnSpc>
+              <a:spcBef>
+                <a:spcPts val="500"/>
+              </a:spcBef>
+              <a:spcAft>
+                <a:spcPts val="600"/>
+              </a:spcAft>
+              <a:buClr>
+                <a:schemeClr val="accent6"/>
+              </a:buClr>
+              <a:buSzPct val="90000"/>
+              <a:buFont typeface="Wingdings" panose="05000000000000000000" pitchFamily="2" charset="2"/>
+              <a:buChar char="§"/>
+              <a:defRPr sz="1200" kern="1200" baseline="0">
+                <a:solidFill>
+                  <a:schemeClr val="tx1"/>
+                </a:solidFill>
+                <a:effectLst/>
+                <a:latin typeface="+mn-lt"/>
+                <a:ea typeface="+mn-ea"/>
+                <a:cs typeface="+mn-cs"/>
+              </a:defRPr>
+            </a:lvl8pPr>
+            <a:lvl9pPr marL="4041648" indent="-338328" algn="l" defTabSz="914400" rtl="0" eaLnBrk="1" latinLnBrk="0" hangingPunct="1">
+              <a:lnSpc>
+                <a:spcPct val="120000"/>
+              </a:lnSpc>
+              <a:spcBef>
+                <a:spcPts val="500"/>
+              </a:spcBef>
+              <a:spcAft>
+                <a:spcPts val="600"/>
+              </a:spcAft>
+              <a:buClr>
+                <a:schemeClr val="accent6"/>
+              </a:buClr>
+              <a:buSzPct val="90000"/>
+              <a:buFont typeface="Wingdings" panose="05000000000000000000" pitchFamily="2" charset="2"/>
+              <a:buChar char="§"/>
+              <a:defRPr sz="1200" kern="1200" baseline="0">
+                <a:solidFill>
+                  <a:schemeClr val="tx1"/>
+                </a:solidFill>
+                <a:effectLst/>
+                <a:latin typeface="+mn-lt"/>
+                <a:ea typeface="+mn-ea"/>
+                <a:cs typeface="+mn-cs"/>
+              </a:defRPr>
+            </a:lvl9pPr>
+          </a:lstStyle>
+          <a:p>
+            <a:pPr marL="457200" lvl="1" indent="0">
+              <a:buFont typeface="Wingdings" panose="05000000000000000000" pitchFamily="2" charset="2"/>
+              <a:buNone/>
+            </a:pPr>
+            <a:endParaRPr lang="en-US" dirty="0"/>
+          </a:p>
+          <a:p>
+            <a:r>
+              <a:rPr lang="en-US" dirty="0"/>
+              <a:t>This type of edge was ignored all together in the model:</a:t>
+            </a:r>
+          </a:p>
+          <a:p>
+            <a:pPr lvl="1"/>
+            <a:r>
+              <a:rPr lang="en-US" dirty="0"/>
+              <a:t>Edge Type 4: from “</a:t>
+            </a:r>
+            <a:r>
+              <a:rPr lang="en-US" dirty="0">
+                <a:solidFill>
+                  <a:schemeClr val="tx2">
+                    <a:lumMod val="50000"/>
+                  </a:schemeClr>
+                </a:solidFill>
+              </a:rPr>
+              <a:t>storage</a:t>
+            </a:r>
+            <a:r>
+              <a:rPr lang="en-US" dirty="0"/>
+              <a:t>” to “</a:t>
+            </a:r>
+            <a:r>
+              <a:rPr lang="en-US" dirty="0">
+                <a:solidFill>
+                  <a:schemeClr val="tx2">
+                    <a:lumMod val="50000"/>
+                  </a:schemeClr>
+                </a:solidFill>
+              </a:rPr>
+              <a:t>storage</a:t>
+            </a:r>
+            <a:r>
+              <a:rPr lang="en-US" dirty="0"/>
+              <a:t>”</a:t>
+            </a:r>
+          </a:p>
+          <a:p>
+            <a:pPr marL="457200" lvl="1" indent="0">
+              <a:buFont typeface="Wingdings" panose="05000000000000000000" pitchFamily="2" charset="2"/>
+              <a:buNone/>
+            </a:pPr>
+            <a:endParaRPr lang="en-US" dirty="0"/>
           </a:p>
         </p:txBody>
       </p:sp>
@@ -12726,6 +13057,341 @@
           </a:fontRef>
         </p:style>
       </p:cxnSp>
+      <p:sp>
+        <p:nvSpPr>
+          <p:cNvPr id="3" name="Content Placeholder 2">
+            <a:extLst>
+              <a:ext uri="{FF2B5EF4-FFF2-40B4-BE49-F238E27FC236}">
+                <a16:creationId xmlns:a16="http://schemas.microsoft.com/office/drawing/2014/main" id="{7E5B9577-9CB3-C7DB-7EFC-A0DED64373DD}"/>
+              </a:ext>
+            </a:extLst>
+          </p:cNvPr>
+          <p:cNvSpPr txBox="1">
+            <a:spLocks/>
+          </p:cNvSpPr>
+          <p:nvPr/>
+        </p:nvSpPr>
+        <p:spPr>
+          <a:xfrm>
+            <a:off x="1262742" y="5456258"/>
+            <a:ext cx="9985266" cy="917908"/>
+          </a:xfrm>
+          <a:prstGeom prst="rect">
+            <a:avLst/>
+          </a:prstGeom>
+        </p:spPr>
+        <p:txBody>
+          <a:bodyPr vert="horz" lIns="91440" tIns="45720" rIns="91440" bIns="45720" rtlCol="0" anchor="ctr">
+            <a:normAutofit fontScale="92500"/>
+          </a:bodyPr>
+          <a:lstStyle>
+            <a:lvl1pPr marL="344488" indent="-344488" algn="l" defTabSz="914400" rtl="0" eaLnBrk="1" latinLnBrk="0" hangingPunct="1">
+              <a:lnSpc>
+                <a:spcPct val="120000"/>
+              </a:lnSpc>
+              <a:spcBef>
+                <a:spcPts val="1000"/>
+              </a:spcBef>
+              <a:spcAft>
+                <a:spcPts val="600"/>
+              </a:spcAft>
+              <a:buClr>
+                <a:schemeClr val="accent6"/>
+              </a:buClr>
+              <a:buSzPct val="90000"/>
+              <a:buFont typeface="Wingdings" panose="05000000000000000000" pitchFamily="2" charset="2"/>
+              <a:buChar char="§"/>
+              <a:defRPr sz="2000" kern="1200">
+                <a:solidFill>
+                  <a:schemeClr val="tx1"/>
+                </a:solidFill>
+                <a:effectLst/>
+                <a:latin typeface="+mn-lt"/>
+                <a:ea typeface="+mn-ea"/>
+                <a:cs typeface="+mn-cs"/>
+              </a:defRPr>
+            </a:lvl1pPr>
+            <a:lvl2pPr marL="795338" indent="-338138" algn="l" defTabSz="914400" rtl="0" eaLnBrk="1" latinLnBrk="0" hangingPunct="1">
+              <a:lnSpc>
+                <a:spcPct val="120000"/>
+              </a:lnSpc>
+              <a:spcBef>
+                <a:spcPts val="500"/>
+              </a:spcBef>
+              <a:spcAft>
+                <a:spcPts val="600"/>
+              </a:spcAft>
+              <a:buClr>
+                <a:schemeClr val="accent6"/>
+              </a:buClr>
+              <a:buSzPct val="90000"/>
+              <a:buFont typeface="Wingdings" panose="05000000000000000000" pitchFamily="2" charset="2"/>
+              <a:buChar char="§"/>
+              <a:defRPr sz="1800" kern="1200">
+                <a:solidFill>
+                  <a:schemeClr val="tx1"/>
+                </a:solidFill>
+                <a:effectLst/>
+                <a:latin typeface="+mn-lt"/>
+                <a:ea typeface="+mn-ea"/>
+                <a:cs typeface="+mn-cs"/>
+              </a:defRPr>
+            </a:lvl2pPr>
+            <a:lvl3pPr marL="1258888" indent="-344488" algn="l" defTabSz="914400" rtl="0" eaLnBrk="1" latinLnBrk="0" hangingPunct="1">
+              <a:lnSpc>
+                <a:spcPct val="120000"/>
+              </a:lnSpc>
+              <a:spcBef>
+                <a:spcPts val="500"/>
+              </a:spcBef>
+              <a:spcAft>
+                <a:spcPts val="600"/>
+              </a:spcAft>
+              <a:buClr>
+                <a:schemeClr val="accent6"/>
+              </a:buClr>
+              <a:buSzPct val="90000"/>
+              <a:buFont typeface="Wingdings" panose="05000000000000000000" pitchFamily="2" charset="2"/>
+              <a:buChar char="§"/>
+              <a:defRPr sz="1600" kern="1200">
+                <a:solidFill>
+                  <a:schemeClr val="tx1"/>
+                </a:solidFill>
+                <a:effectLst/>
+                <a:latin typeface="+mn-lt"/>
+                <a:ea typeface="+mn-ea"/>
+                <a:cs typeface="+mn-cs"/>
+              </a:defRPr>
+            </a:lvl3pPr>
+            <a:lvl4pPr marL="1709738" indent="-338138" algn="l" defTabSz="914400" rtl="0" eaLnBrk="1" latinLnBrk="0" hangingPunct="1">
+              <a:lnSpc>
+                <a:spcPct val="120000"/>
+              </a:lnSpc>
+              <a:spcBef>
+                <a:spcPts val="500"/>
+              </a:spcBef>
+              <a:spcAft>
+                <a:spcPts val="600"/>
+              </a:spcAft>
+              <a:buClr>
+                <a:schemeClr val="accent6"/>
+              </a:buClr>
+              <a:buSzPct val="90000"/>
+              <a:buFont typeface="Wingdings" panose="05000000000000000000" pitchFamily="2" charset="2"/>
+              <a:buChar char="§"/>
+              <a:defRPr sz="1400" kern="1200">
+                <a:solidFill>
+                  <a:schemeClr val="tx1"/>
+                </a:solidFill>
+                <a:effectLst/>
+                <a:latin typeface="+mn-lt"/>
+                <a:ea typeface="+mn-ea"/>
+                <a:cs typeface="+mn-cs"/>
+              </a:defRPr>
+            </a:lvl4pPr>
+            <a:lvl5pPr marL="2173288" indent="-344488" algn="l" defTabSz="914400" rtl="0" eaLnBrk="1" latinLnBrk="0" hangingPunct="1">
+              <a:lnSpc>
+                <a:spcPct val="120000"/>
+              </a:lnSpc>
+              <a:spcBef>
+                <a:spcPts val="500"/>
+              </a:spcBef>
+              <a:spcAft>
+                <a:spcPts val="600"/>
+              </a:spcAft>
+              <a:buClr>
+                <a:schemeClr val="accent6"/>
+              </a:buClr>
+              <a:buSzPct val="90000"/>
+              <a:buFont typeface="Wingdings" panose="05000000000000000000" pitchFamily="2" charset="2"/>
+              <a:buChar char="§"/>
+              <a:defRPr sz="1200" kern="1200">
+                <a:solidFill>
+                  <a:schemeClr val="tx1"/>
+                </a:solidFill>
+                <a:effectLst/>
+                <a:latin typeface="+mn-lt"/>
+                <a:ea typeface="+mn-ea"/>
+                <a:cs typeface="+mn-cs"/>
+              </a:defRPr>
+            </a:lvl5pPr>
+            <a:lvl6pPr marL="2642616" indent="-338328" algn="l" defTabSz="914400" rtl="0" eaLnBrk="1" latinLnBrk="0" hangingPunct="1">
+              <a:lnSpc>
+                <a:spcPct val="120000"/>
+              </a:lnSpc>
+              <a:spcBef>
+                <a:spcPts val="500"/>
+              </a:spcBef>
+              <a:spcAft>
+                <a:spcPts val="600"/>
+              </a:spcAft>
+              <a:buClr>
+                <a:schemeClr val="accent6"/>
+              </a:buClr>
+              <a:buSzPct val="90000"/>
+              <a:buFont typeface="Wingdings" panose="05000000000000000000" pitchFamily="2" charset="2"/>
+              <a:buChar char="§"/>
+              <a:defRPr sz="1200" kern="1200" baseline="0">
+                <a:solidFill>
+                  <a:schemeClr val="tx1"/>
+                </a:solidFill>
+                <a:effectLst/>
+                <a:latin typeface="+mn-lt"/>
+                <a:ea typeface="+mn-ea"/>
+                <a:cs typeface="+mn-cs"/>
+              </a:defRPr>
+            </a:lvl6pPr>
+            <a:lvl7pPr marL="3108960" indent="-338328" algn="l" defTabSz="914400" rtl="0" eaLnBrk="1" latinLnBrk="0" hangingPunct="1">
+              <a:lnSpc>
+                <a:spcPct val="120000"/>
+              </a:lnSpc>
+              <a:spcBef>
+                <a:spcPts val="500"/>
+              </a:spcBef>
+              <a:spcAft>
+                <a:spcPts val="600"/>
+              </a:spcAft>
+              <a:buClr>
+                <a:schemeClr val="accent6"/>
+              </a:buClr>
+              <a:buSzPct val="90000"/>
+              <a:buFont typeface="Wingdings" panose="05000000000000000000" pitchFamily="2" charset="2"/>
+              <a:buChar char="§"/>
+              <a:defRPr sz="1200" kern="1200" baseline="0">
+                <a:solidFill>
+                  <a:schemeClr val="tx1"/>
+                </a:solidFill>
+                <a:effectLst/>
+                <a:latin typeface="+mn-lt"/>
+                <a:ea typeface="+mn-ea"/>
+                <a:cs typeface="+mn-cs"/>
+              </a:defRPr>
+            </a:lvl7pPr>
+            <a:lvl8pPr marL="3575304" indent="-338328" algn="l" defTabSz="914400" rtl="0" eaLnBrk="1" latinLnBrk="0" hangingPunct="1">
+              <a:lnSpc>
+                <a:spcPct val="120000"/>
+              </a:lnSpc>
+              <a:spcBef>
+                <a:spcPts val="500"/>
+              </a:spcBef>
+              <a:spcAft>
+                <a:spcPts val="600"/>
+              </a:spcAft>
+              <a:buClr>
+                <a:schemeClr val="accent6"/>
+              </a:buClr>
+              <a:buSzPct val="90000"/>
+              <a:buFont typeface="Wingdings" panose="05000000000000000000" pitchFamily="2" charset="2"/>
+              <a:buChar char="§"/>
+              <a:defRPr sz="1200" kern="1200" baseline="0">
+                <a:solidFill>
+                  <a:schemeClr val="tx1"/>
+                </a:solidFill>
+                <a:effectLst/>
+                <a:latin typeface="+mn-lt"/>
+                <a:ea typeface="+mn-ea"/>
+                <a:cs typeface="+mn-cs"/>
+              </a:defRPr>
+            </a:lvl8pPr>
+            <a:lvl9pPr marL="4041648" indent="-338328" algn="l" defTabSz="914400" rtl="0" eaLnBrk="1" latinLnBrk="0" hangingPunct="1">
+              <a:lnSpc>
+                <a:spcPct val="120000"/>
+              </a:lnSpc>
+              <a:spcBef>
+                <a:spcPts val="500"/>
+              </a:spcBef>
+              <a:spcAft>
+                <a:spcPts val="600"/>
+              </a:spcAft>
+              <a:buClr>
+                <a:schemeClr val="accent6"/>
+              </a:buClr>
+              <a:buSzPct val="90000"/>
+              <a:buFont typeface="Wingdings" panose="05000000000000000000" pitchFamily="2" charset="2"/>
+              <a:buChar char="§"/>
+              <a:defRPr sz="1200" kern="1200" baseline="0">
+                <a:solidFill>
+                  <a:schemeClr val="tx1"/>
+                </a:solidFill>
+                <a:effectLst/>
+                <a:latin typeface="+mn-lt"/>
+                <a:ea typeface="+mn-ea"/>
+                <a:cs typeface="+mn-cs"/>
+              </a:defRPr>
+            </a:lvl9pPr>
+          </a:lstStyle>
+          <a:p>
+            <a:pPr marL="457200" lvl="1" indent="0">
+              <a:buNone/>
+            </a:pPr>
+            <a:r>
+              <a:rPr lang="en-US" dirty="0"/>
+              <a:t>7. Update graph, the unmet demands volume will be </a:t>
+            </a:r>
+            <a:r>
+              <a:rPr lang="en-US" dirty="0" err="1"/>
+              <a:t>deficiency_current</a:t>
+            </a:r>
+            <a:r>
+              <a:rPr lang="en-US" dirty="0"/>
+              <a:t>, and if it exceeds </a:t>
+            </a:r>
+            <a:r>
+              <a:rPr lang="en-US" dirty="0" err="1"/>
+              <a:t>deficiency_max</a:t>
+            </a:r>
+            <a:r>
+              <a:rPr lang="en-US" dirty="0"/>
+              <a:t>, the entity is not active anymore. The extra source volume will also go to waste.</a:t>
+            </a:r>
+          </a:p>
+        </p:txBody>
+      </p:sp>
+      <p:cxnSp>
+        <p:nvCxnSpPr>
+          <p:cNvPr id="6" name="Straight Connector 5">
+            <a:extLst>
+              <a:ext uri="{FF2B5EF4-FFF2-40B4-BE49-F238E27FC236}">
+                <a16:creationId xmlns:a16="http://schemas.microsoft.com/office/drawing/2014/main" id="{2EB33073-2F54-1D4F-7C07-4446056587C8}"/>
+              </a:ext>
+            </a:extLst>
+          </p:cNvPr>
+          <p:cNvCxnSpPr/>
+          <p:nvPr/>
+        </p:nvCxnSpPr>
+        <p:spPr>
+          <a:xfrm>
+            <a:off x="1410789" y="6481620"/>
+            <a:ext cx="9159350" cy="0"/>
+          </a:xfrm>
+          <a:prstGeom prst="line">
+            <a:avLst/>
+          </a:prstGeom>
+          <a:ln w="19050">
+            <a:solidFill>
+              <a:schemeClr val="bg1">
+                <a:lumMod val="50000"/>
+                <a:lumOff val="50000"/>
+              </a:schemeClr>
+            </a:solidFill>
+            <a:prstDash val="sysDot"/>
+          </a:ln>
+        </p:spPr>
+        <p:style>
+          <a:lnRef idx="1">
+            <a:schemeClr val="accent1"/>
+          </a:lnRef>
+          <a:fillRef idx="0">
+            <a:schemeClr val="accent1"/>
+          </a:fillRef>
+          <a:effectRef idx="0">
+            <a:schemeClr val="accent1"/>
+          </a:effectRef>
+          <a:fontRef idx="minor">
+            <a:schemeClr val="tx1"/>
+          </a:fontRef>
+        </p:style>
+      </p:cxnSp>
     </p:spTree>
     <p:extLst>
       <p:ext uri="{BB962C8B-B14F-4D97-AF65-F5344CB8AC3E}">
@@ -12932,6 +13598,94 @@
                       </p:childTnLst>
                     </p:cTn>
                   </p:par>
+                  <p:par>
+                    <p:cTn id="19" fill="hold">
+                      <p:stCondLst>
+                        <p:cond delay="indefinite"/>
+                      </p:stCondLst>
+                      <p:childTnLst>
+                        <p:par>
+                          <p:cTn id="20" fill="hold">
+                            <p:stCondLst>
+                              <p:cond delay="0"/>
+                            </p:stCondLst>
+                            <p:childTnLst>
+                              <p:par>
+                                <p:cTn id="21" presetID="10" presetClass="entr" presetSubtype="0" fill="hold" nodeType="clickEffect">
+                                  <p:stCondLst>
+                                    <p:cond delay="0"/>
+                                  </p:stCondLst>
+                                  <p:childTnLst>
+                                    <p:set>
+                                      <p:cBhvr>
+                                        <p:cTn id="22" dur="1" fill="hold">
+                                          <p:stCondLst>
+                                            <p:cond delay="0"/>
+                                          </p:stCondLst>
+                                        </p:cTn>
+                                        <p:tgtEl>
+                                          <p:spTgt spid="6"/>
+                                        </p:tgtEl>
+                                        <p:attrNameLst>
+                                          <p:attrName>style.visibility</p:attrName>
+                                        </p:attrNameLst>
+                                      </p:cBhvr>
+                                      <p:to>
+                                        <p:strVal val="visible"/>
+                                      </p:to>
+                                    </p:set>
+                                    <p:animEffect transition="in" filter="fade">
+                                      <p:cBhvr>
+                                        <p:cTn id="23" dur="500"/>
+                                        <p:tgtEl>
+                                          <p:spTgt spid="6"/>
+                                        </p:tgtEl>
+                                      </p:cBhvr>
+                                    </p:animEffect>
+                                  </p:childTnLst>
+                                </p:cTn>
+                              </p:par>
+                              <p:par>
+                                <p:cTn id="24" presetID="10" presetClass="entr" presetSubtype="0" fill="hold" grpId="0" nodeType="withEffect">
+                                  <p:stCondLst>
+                                    <p:cond delay="0"/>
+                                  </p:stCondLst>
+                                  <p:childTnLst>
+                                    <p:set>
+                                      <p:cBhvr>
+                                        <p:cTn id="25" dur="1" fill="hold">
+                                          <p:stCondLst>
+                                            <p:cond delay="0"/>
+                                          </p:stCondLst>
+                                        </p:cTn>
+                                        <p:tgtEl>
+                                          <p:spTgt spid="3"/>
+                                        </p:tgtEl>
+                                        <p:attrNameLst>
+                                          <p:attrName>style.visibility</p:attrName>
+                                        </p:attrNameLst>
+                                      </p:cBhvr>
+                                      <p:to>
+                                        <p:strVal val="visible"/>
+                                      </p:to>
+                                    </p:set>
+                                    <p:animEffect transition="in" filter="fade">
+                                      <p:cBhvr>
+                                        <p:cTn id="26" dur="500"/>
+                                        <p:tgtEl>
+                                          <p:spTgt spid="3"/>
+                                        </p:tgtEl>
+                                      </p:cBhvr>
+                                    </p:animEffect>
+                                  </p:childTnLst>
+                                </p:cTn>
+                              </p:par>
+                            </p:childTnLst>
+                          </p:cTn>
+                        </p:par>
+                      </p:childTnLst>
+                    </p:cTn>
+                  </p:par>
                 </p:childTnLst>
               </p:cTn>
               <p:prevCondLst>
@@ -12956,6 +13710,7 @@
     <p:bldLst>
       <p:bldP spid="5" grpId="0"/>
       <p:bldP spid="11" grpId="0"/>
+      <p:bldP spid="3" grpId="0"/>
     </p:bldLst>
   </p:timing>
 </p:sld>
@@ -16914,7 +17669,7 @@
             <a:pPr algn="l"/>
             <a:r>
               <a:rPr lang="en-US" dirty="0"/>
-              <a:t>Comments on Method 1</a:t>
+              <a:t>How Economy Works: “Method 1”</a:t>
             </a:r>
           </a:p>
         </p:txBody>
@@ -16950,41 +17705,663 @@
       </p:sp>
       <p:sp>
         <p:nvSpPr>
-          <p:cNvPr id="6" name="Content Placeholder 5">
+          <p:cNvPr id="12" name="Content Placeholder 2">
             <a:extLst>
               <a:ext uri="{FF2B5EF4-FFF2-40B4-BE49-F238E27FC236}">
-                <a16:creationId xmlns:a16="http://schemas.microsoft.com/office/drawing/2014/main" id="{AE78ECED-E4CE-5F02-3612-32A693B79946}"/>
+                <a16:creationId xmlns:a16="http://schemas.microsoft.com/office/drawing/2014/main" id="{D1977E11-A53C-285E-1D75-355AB73F60DB}"/>
               </a:ext>
             </a:extLst>
           </p:cNvPr>
-          <p:cNvSpPr>
-            <a:spLocks noGrp="1"/>
+          <p:cNvSpPr txBox="1">
+            <a:spLocks/>
           </p:cNvSpPr>
-          <p:nvPr>
-            <p:ph idx="1"/>
-          </p:nvPr>
+          <p:nvPr/>
         </p:nvSpPr>
         <p:spPr>
           <a:xfrm>
-            <a:off x="2197730" y="2052116"/>
-            <a:ext cx="7796540" cy="3997828"/>
+            <a:off x="1001486" y="1428099"/>
+            <a:ext cx="2220686" cy="931655"/>
           </a:xfrm>
+          <a:prstGeom prst="rect">
+            <a:avLst/>
+          </a:prstGeom>
         </p:spPr>
         <p:txBody>
-          <a:bodyPr/>
-          <a:lstStyle/>
-          <a:p>
-            <a:r>
-              <a:rPr lang="en-US" dirty="0"/>
-              <a:t>a</a:t>
+          <a:bodyPr vert="horz" lIns="91440" tIns="45720" rIns="91440" bIns="45720" rtlCol="0" anchor="ctr">
+            <a:normAutofit/>
+          </a:bodyPr>
+          <a:lstStyle>
+            <a:lvl1pPr marL="344488" indent="-344488" algn="l" defTabSz="914400" rtl="0" eaLnBrk="1" latinLnBrk="0" hangingPunct="1">
+              <a:lnSpc>
+                <a:spcPct val="120000"/>
+              </a:lnSpc>
+              <a:spcBef>
+                <a:spcPts val="1000"/>
+              </a:spcBef>
+              <a:spcAft>
+                <a:spcPts val="600"/>
+              </a:spcAft>
+              <a:buClr>
+                <a:schemeClr val="accent6"/>
+              </a:buClr>
+              <a:buSzPct val="90000"/>
+              <a:buFont typeface="Wingdings" panose="05000000000000000000" pitchFamily="2" charset="2"/>
+              <a:buChar char="§"/>
+              <a:defRPr sz="2000" kern="1200">
+                <a:solidFill>
+                  <a:schemeClr val="tx1"/>
+                </a:solidFill>
+                <a:effectLst/>
+                <a:latin typeface="+mn-lt"/>
+                <a:ea typeface="+mn-ea"/>
+                <a:cs typeface="+mn-cs"/>
+              </a:defRPr>
+            </a:lvl1pPr>
+            <a:lvl2pPr marL="795338" indent="-338138" algn="l" defTabSz="914400" rtl="0" eaLnBrk="1" latinLnBrk="0" hangingPunct="1">
+              <a:lnSpc>
+                <a:spcPct val="120000"/>
+              </a:lnSpc>
+              <a:spcBef>
+                <a:spcPts val="500"/>
+              </a:spcBef>
+              <a:spcAft>
+                <a:spcPts val="600"/>
+              </a:spcAft>
+              <a:buClr>
+                <a:schemeClr val="accent6"/>
+              </a:buClr>
+              <a:buSzPct val="90000"/>
+              <a:buFont typeface="Wingdings" panose="05000000000000000000" pitchFamily="2" charset="2"/>
+              <a:buChar char="§"/>
+              <a:defRPr sz="1800" kern="1200">
+                <a:solidFill>
+                  <a:schemeClr val="tx1"/>
+                </a:solidFill>
+                <a:effectLst/>
+                <a:latin typeface="+mn-lt"/>
+                <a:ea typeface="+mn-ea"/>
+                <a:cs typeface="+mn-cs"/>
+              </a:defRPr>
+            </a:lvl2pPr>
+            <a:lvl3pPr marL="1258888" indent="-344488" algn="l" defTabSz="914400" rtl="0" eaLnBrk="1" latinLnBrk="0" hangingPunct="1">
+              <a:lnSpc>
+                <a:spcPct val="120000"/>
+              </a:lnSpc>
+              <a:spcBef>
+                <a:spcPts val="500"/>
+              </a:spcBef>
+              <a:spcAft>
+                <a:spcPts val="600"/>
+              </a:spcAft>
+              <a:buClr>
+                <a:schemeClr val="accent6"/>
+              </a:buClr>
+              <a:buSzPct val="90000"/>
+              <a:buFont typeface="Wingdings" panose="05000000000000000000" pitchFamily="2" charset="2"/>
+              <a:buChar char="§"/>
+              <a:defRPr sz="1600" kern="1200">
+                <a:solidFill>
+                  <a:schemeClr val="tx1"/>
+                </a:solidFill>
+                <a:effectLst/>
+                <a:latin typeface="+mn-lt"/>
+                <a:ea typeface="+mn-ea"/>
+                <a:cs typeface="+mn-cs"/>
+              </a:defRPr>
+            </a:lvl3pPr>
+            <a:lvl4pPr marL="1709738" indent="-338138" algn="l" defTabSz="914400" rtl="0" eaLnBrk="1" latinLnBrk="0" hangingPunct="1">
+              <a:lnSpc>
+                <a:spcPct val="120000"/>
+              </a:lnSpc>
+              <a:spcBef>
+                <a:spcPts val="500"/>
+              </a:spcBef>
+              <a:spcAft>
+                <a:spcPts val="600"/>
+              </a:spcAft>
+              <a:buClr>
+                <a:schemeClr val="accent6"/>
+              </a:buClr>
+              <a:buSzPct val="90000"/>
+              <a:buFont typeface="Wingdings" panose="05000000000000000000" pitchFamily="2" charset="2"/>
+              <a:buChar char="§"/>
+              <a:defRPr sz="1400" kern="1200">
+                <a:solidFill>
+                  <a:schemeClr val="tx1"/>
+                </a:solidFill>
+                <a:effectLst/>
+                <a:latin typeface="+mn-lt"/>
+                <a:ea typeface="+mn-ea"/>
+                <a:cs typeface="+mn-cs"/>
+              </a:defRPr>
+            </a:lvl4pPr>
+            <a:lvl5pPr marL="2173288" indent="-344488" algn="l" defTabSz="914400" rtl="0" eaLnBrk="1" latinLnBrk="0" hangingPunct="1">
+              <a:lnSpc>
+                <a:spcPct val="120000"/>
+              </a:lnSpc>
+              <a:spcBef>
+                <a:spcPts val="500"/>
+              </a:spcBef>
+              <a:spcAft>
+                <a:spcPts val="600"/>
+              </a:spcAft>
+              <a:buClr>
+                <a:schemeClr val="accent6"/>
+              </a:buClr>
+              <a:buSzPct val="90000"/>
+              <a:buFont typeface="Wingdings" panose="05000000000000000000" pitchFamily="2" charset="2"/>
+              <a:buChar char="§"/>
+              <a:defRPr sz="1200" kern="1200">
+                <a:solidFill>
+                  <a:schemeClr val="tx1"/>
+                </a:solidFill>
+                <a:effectLst/>
+                <a:latin typeface="+mn-lt"/>
+                <a:ea typeface="+mn-ea"/>
+                <a:cs typeface="+mn-cs"/>
+              </a:defRPr>
+            </a:lvl5pPr>
+            <a:lvl6pPr marL="2642616" indent="-338328" algn="l" defTabSz="914400" rtl="0" eaLnBrk="1" latinLnBrk="0" hangingPunct="1">
+              <a:lnSpc>
+                <a:spcPct val="120000"/>
+              </a:lnSpc>
+              <a:spcBef>
+                <a:spcPts val="500"/>
+              </a:spcBef>
+              <a:spcAft>
+                <a:spcPts val="600"/>
+              </a:spcAft>
+              <a:buClr>
+                <a:schemeClr val="accent6"/>
+              </a:buClr>
+              <a:buSzPct val="90000"/>
+              <a:buFont typeface="Wingdings" panose="05000000000000000000" pitchFamily="2" charset="2"/>
+              <a:buChar char="§"/>
+              <a:defRPr sz="1200" kern="1200" baseline="0">
+                <a:solidFill>
+                  <a:schemeClr val="tx1"/>
+                </a:solidFill>
+                <a:effectLst/>
+                <a:latin typeface="+mn-lt"/>
+                <a:ea typeface="+mn-ea"/>
+                <a:cs typeface="+mn-cs"/>
+              </a:defRPr>
+            </a:lvl6pPr>
+            <a:lvl7pPr marL="3108960" indent="-338328" algn="l" defTabSz="914400" rtl="0" eaLnBrk="1" latinLnBrk="0" hangingPunct="1">
+              <a:lnSpc>
+                <a:spcPct val="120000"/>
+              </a:lnSpc>
+              <a:spcBef>
+                <a:spcPts val="500"/>
+              </a:spcBef>
+              <a:spcAft>
+                <a:spcPts val="600"/>
+              </a:spcAft>
+              <a:buClr>
+                <a:schemeClr val="accent6"/>
+              </a:buClr>
+              <a:buSzPct val="90000"/>
+              <a:buFont typeface="Wingdings" panose="05000000000000000000" pitchFamily="2" charset="2"/>
+              <a:buChar char="§"/>
+              <a:defRPr sz="1200" kern="1200" baseline="0">
+                <a:solidFill>
+                  <a:schemeClr val="tx1"/>
+                </a:solidFill>
+                <a:effectLst/>
+                <a:latin typeface="+mn-lt"/>
+                <a:ea typeface="+mn-ea"/>
+                <a:cs typeface="+mn-cs"/>
+              </a:defRPr>
+            </a:lvl7pPr>
+            <a:lvl8pPr marL="3575304" indent="-338328" algn="l" defTabSz="914400" rtl="0" eaLnBrk="1" latinLnBrk="0" hangingPunct="1">
+              <a:lnSpc>
+                <a:spcPct val="120000"/>
+              </a:lnSpc>
+              <a:spcBef>
+                <a:spcPts val="500"/>
+              </a:spcBef>
+              <a:spcAft>
+                <a:spcPts val="600"/>
+              </a:spcAft>
+              <a:buClr>
+                <a:schemeClr val="accent6"/>
+              </a:buClr>
+              <a:buSzPct val="90000"/>
+              <a:buFont typeface="Wingdings" panose="05000000000000000000" pitchFamily="2" charset="2"/>
+              <a:buChar char="§"/>
+              <a:defRPr sz="1200" kern="1200" baseline="0">
+                <a:solidFill>
+                  <a:schemeClr val="tx1"/>
+                </a:solidFill>
+                <a:effectLst/>
+                <a:latin typeface="+mn-lt"/>
+                <a:ea typeface="+mn-ea"/>
+                <a:cs typeface="+mn-cs"/>
+              </a:defRPr>
+            </a:lvl8pPr>
+            <a:lvl9pPr marL="4041648" indent="-338328" algn="l" defTabSz="914400" rtl="0" eaLnBrk="1" latinLnBrk="0" hangingPunct="1">
+              <a:lnSpc>
+                <a:spcPct val="120000"/>
+              </a:lnSpc>
+              <a:spcBef>
+                <a:spcPts val="500"/>
+              </a:spcBef>
+              <a:spcAft>
+                <a:spcPts val="600"/>
+              </a:spcAft>
+              <a:buClr>
+                <a:schemeClr val="accent6"/>
+              </a:buClr>
+              <a:buSzPct val="90000"/>
+              <a:buFont typeface="Wingdings" panose="05000000000000000000" pitchFamily="2" charset="2"/>
+              <a:buChar char="§"/>
+              <a:defRPr sz="1200" kern="1200" baseline="0">
+                <a:solidFill>
+                  <a:schemeClr val="tx1"/>
+                </a:solidFill>
+                <a:effectLst/>
+                <a:latin typeface="+mn-lt"/>
+                <a:ea typeface="+mn-ea"/>
+                <a:cs typeface="+mn-cs"/>
+              </a:defRPr>
+            </a:lvl9pPr>
+          </a:lstStyle>
+          <a:p>
+            <a:pPr marL="457200" lvl="1" indent="0">
+              <a:buFont typeface="Wingdings" panose="05000000000000000000" pitchFamily="2" charset="2"/>
+              <a:buNone/>
+            </a:pPr>
+            <a:r>
+              <a:rPr lang="en-US" sz="2000" dirty="0"/>
+              <a:t>Phase 2/2:</a:t>
             </a:r>
           </a:p>
         </p:txBody>
       </p:sp>
+      <p:sp>
+        <p:nvSpPr>
+          <p:cNvPr id="20" name="Content Placeholder 2">
+            <a:extLst>
+              <a:ext uri="{FF2B5EF4-FFF2-40B4-BE49-F238E27FC236}">
+                <a16:creationId xmlns:a16="http://schemas.microsoft.com/office/drawing/2014/main" id="{9EA0B4D0-87AA-AD72-0867-F2BEBC4010C7}"/>
+              </a:ext>
+            </a:extLst>
+          </p:cNvPr>
+          <p:cNvSpPr txBox="1">
+            <a:spLocks/>
+          </p:cNvSpPr>
+          <p:nvPr/>
+        </p:nvSpPr>
+        <p:spPr>
+          <a:xfrm>
+            <a:off x="1262738" y="2222534"/>
+            <a:ext cx="9187543" cy="1239760"/>
+          </a:xfrm>
+          <a:prstGeom prst="rect">
+            <a:avLst/>
+          </a:prstGeom>
+        </p:spPr>
+        <p:txBody>
+          <a:bodyPr vert="horz" lIns="91440" tIns="45720" rIns="91440" bIns="45720" rtlCol="0" anchor="ctr">
+            <a:normAutofit/>
+          </a:bodyPr>
+          <a:lstStyle>
+            <a:lvl1pPr marL="344488" indent="-344488" algn="l" defTabSz="914400" rtl="0" eaLnBrk="1" latinLnBrk="0" hangingPunct="1">
+              <a:lnSpc>
+                <a:spcPct val="120000"/>
+              </a:lnSpc>
+              <a:spcBef>
+                <a:spcPts val="1000"/>
+              </a:spcBef>
+              <a:spcAft>
+                <a:spcPts val="600"/>
+              </a:spcAft>
+              <a:buClr>
+                <a:schemeClr val="accent6"/>
+              </a:buClr>
+              <a:buSzPct val="90000"/>
+              <a:buFont typeface="Wingdings" panose="05000000000000000000" pitchFamily="2" charset="2"/>
+              <a:buChar char="§"/>
+              <a:defRPr sz="2000" kern="1200">
+                <a:solidFill>
+                  <a:schemeClr val="tx1"/>
+                </a:solidFill>
+                <a:effectLst/>
+                <a:latin typeface="+mn-lt"/>
+                <a:ea typeface="+mn-ea"/>
+                <a:cs typeface="+mn-cs"/>
+              </a:defRPr>
+            </a:lvl1pPr>
+            <a:lvl2pPr marL="795338" indent="-338138" algn="l" defTabSz="914400" rtl="0" eaLnBrk="1" latinLnBrk="0" hangingPunct="1">
+              <a:lnSpc>
+                <a:spcPct val="120000"/>
+              </a:lnSpc>
+              <a:spcBef>
+                <a:spcPts val="500"/>
+              </a:spcBef>
+              <a:spcAft>
+                <a:spcPts val="600"/>
+              </a:spcAft>
+              <a:buClr>
+                <a:schemeClr val="accent6"/>
+              </a:buClr>
+              <a:buSzPct val="90000"/>
+              <a:buFont typeface="Wingdings" panose="05000000000000000000" pitchFamily="2" charset="2"/>
+              <a:buChar char="§"/>
+              <a:defRPr sz="1800" kern="1200">
+                <a:solidFill>
+                  <a:schemeClr val="tx1"/>
+                </a:solidFill>
+                <a:effectLst/>
+                <a:latin typeface="+mn-lt"/>
+                <a:ea typeface="+mn-ea"/>
+                <a:cs typeface="+mn-cs"/>
+              </a:defRPr>
+            </a:lvl2pPr>
+            <a:lvl3pPr marL="1258888" indent="-344488" algn="l" defTabSz="914400" rtl="0" eaLnBrk="1" latinLnBrk="0" hangingPunct="1">
+              <a:lnSpc>
+                <a:spcPct val="120000"/>
+              </a:lnSpc>
+              <a:spcBef>
+                <a:spcPts val="500"/>
+              </a:spcBef>
+              <a:spcAft>
+                <a:spcPts val="600"/>
+              </a:spcAft>
+              <a:buClr>
+                <a:schemeClr val="accent6"/>
+              </a:buClr>
+              <a:buSzPct val="90000"/>
+              <a:buFont typeface="Wingdings" panose="05000000000000000000" pitchFamily="2" charset="2"/>
+              <a:buChar char="§"/>
+              <a:defRPr sz="1600" kern="1200">
+                <a:solidFill>
+                  <a:schemeClr val="tx1"/>
+                </a:solidFill>
+                <a:effectLst/>
+                <a:latin typeface="+mn-lt"/>
+                <a:ea typeface="+mn-ea"/>
+                <a:cs typeface="+mn-cs"/>
+              </a:defRPr>
+            </a:lvl3pPr>
+            <a:lvl4pPr marL="1709738" indent="-338138" algn="l" defTabSz="914400" rtl="0" eaLnBrk="1" latinLnBrk="0" hangingPunct="1">
+              <a:lnSpc>
+                <a:spcPct val="120000"/>
+              </a:lnSpc>
+              <a:spcBef>
+                <a:spcPts val="500"/>
+              </a:spcBef>
+              <a:spcAft>
+                <a:spcPts val="600"/>
+              </a:spcAft>
+              <a:buClr>
+                <a:schemeClr val="accent6"/>
+              </a:buClr>
+              <a:buSzPct val="90000"/>
+              <a:buFont typeface="Wingdings" panose="05000000000000000000" pitchFamily="2" charset="2"/>
+              <a:buChar char="§"/>
+              <a:defRPr sz="1400" kern="1200">
+                <a:solidFill>
+                  <a:schemeClr val="tx1"/>
+                </a:solidFill>
+                <a:effectLst/>
+                <a:latin typeface="+mn-lt"/>
+                <a:ea typeface="+mn-ea"/>
+                <a:cs typeface="+mn-cs"/>
+              </a:defRPr>
+            </a:lvl4pPr>
+            <a:lvl5pPr marL="2173288" indent="-344488" algn="l" defTabSz="914400" rtl="0" eaLnBrk="1" latinLnBrk="0" hangingPunct="1">
+              <a:lnSpc>
+                <a:spcPct val="120000"/>
+              </a:lnSpc>
+              <a:spcBef>
+                <a:spcPts val="500"/>
+              </a:spcBef>
+              <a:spcAft>
+                <a:spcPts val="600"/>
+              </a:spcAft>
+              <a:buClr>
+                <a:schemeClr val="accent6"/>
+              </a:buClr>
+              <a:buSzPct val="90000"/>
+              <a:buFont typeface="Wingdings" panose="05000000000000000000" pitchFamily="2" charset="2"/>
+              <a:buChar char="§"/>
+              <a:defRPr sz="1200" kern="1200">
+                <a:solidFill>
+                  <a:schemeClr val="tx1"/>
+                </a:solidFill>
+                <a:effectLst/>
+                <a:latin typeface="+mn-lt"/>
+                <a:ea typeface="+mn-ea"/>
+                <a:cs typeface="+mn-cs"/>
+              </a:defRPr>
+            </a:lvl5pPr>
+            <a:lvl6pPr marL="2642616" indent="-338328" algn="l" defTabSz="914400" rtl="0" eaLnBrk="1" latinLnBrk="0" hangingPunct="1">
+              <a:lnSpc>
+                <a:spcPct val="120000"/>
+              </a:lnSpc>
+              <a:spcBef>
+                <a:spcPts val="500"/>
+              </a:spcBef>
+              <a:spcAft>
+                <a:spcPts val="600"/>
+              </a:spcAft>
+              <a:buClr>
+                <a:schemeClr val="accent6"/>
+              </a:buClr>
+              <a:buSzPct val="90000"/>
+              <a:buFont typeface="Wingdings" panose="05000000000000000000" pitchFamily="2" charset="2"/>
+              <a:buChar char="§"/>
+              <a:defRPr sz="1200" kern="1200" baseline="0">
+                <a:solidFill>
+                  <a:schemeClr val="tx1"/>
+                </a:solidFill>
+                <a:effectLst/>
+                <a:latin typeface="+mn-lt"/>
+                <a:ea typeface="+mn-ea"/>
+                <a:cs typeface="+mn-cs"/>
+              </a:defRPr>
+            </a:lvl6pPr>
+            <a:lvl7pPr marL="3108960" indent="-338328" algn="l" defTabSz="914400" rtl="0" eaLnBrk="1" latinLnBrk="0" hangingPunct="1">
+              <a:lnSpc>
+                <a:spcPct val="120000"/>
+              </a:lnSpc>
+              <a:spcBef>
+                <a:spcPts val="500"/>
+              </a:spcBef>
+              <a:spcAft>
+                <a:spcPts val="600"/>
+              </a:spcAft>
+              <a:buClr>
+                <a:schemeClr val="accent6"/>
+              </a:buClr>
+              <a:buSzPct val="90000"/>
+              <a:buFont typeface="Wingdings" panose="05000000000000000000" pitchFamily="2" charset="2"/>
+              <a:buChar char="§"/>
+              <a:defRPr sz="1200" kern="1200" baseline="0">
+                <a:solidFill>
+                  <a:schemeClr val="tx1"/>
+                </a:solidFill>
+                <a:effectLst/>
+                <a:latin typeface="+mn-lt"/>
+                <a:ea typeface="+mn-ea"/>
+                <a:cs typeface="+mn-cs"/>
+              </a:defRPr>
+            </a:lvl7pPr>
+            <a:lvl8pPr marL="3575304" indent="-338328" algn="l" defTabSz="914400" rtl="0" eaLnBrk="1" latinLnBrk="0" hangingPunct="1">
+              <a:lnSpc>
+                <a:spcPct val="120000"/>
+              </a:lnSpc>
+              <a:spcBef>
+                <a:spcPts val="500"/>
+              </a:spcBef>
+              <a:spcAft>
+                <a:spcPts val="600"/>
+              </a:spcAft>
+              <a:buClr>
+                <a:schemeClr val="accent6"/>
+              </a:buClr>
+              <a:buSzPct val="90000"/>
+              <a:buFont typeface="Wingdings" panose="05000000000000000000" pitchFamily="2" charset="2"/>
+              <a:buChar char="§"/>
+              <a:defRPr sz="1200" kern="1200" baseline="0">
+                <a:solidFill>
+                  <a:schemeClr val="tx1"/>
+                </a:solidFill>
+                <a:effectLst/>
+                <a:latin typeface="+mn-lt"/>
+                <a:ea typeface="+mn-ea"/>
+                <a:cs typeface="+mn-cs"/>
+              </a:defRPr>
+            </a:lvl8pPr>
+            <a:lvl9pPr marL="4041648" indent="-338328" algn="l" defTabSz="914400" rtl="0" eaLnBrk="1" latinLnBrk="0" hangingPunct="1">
+              <a:lnSpc>
+                <a:spcPct val="120000"/>
+              </a:lnSpc>
+              <a:spcBef>
+                <a:spcPts val="500"/>
+              </a:spcBef>
+              <a:spcAft>
+                <a:spcPts val="600"/>
+              </a:spcAft>
+              <a:buClr>
+                <a:schemeClr val="accent6"/>
+              </a:buClr>
+              <a:buSzPct val="90000"/>
+              <a:buFont typeface="Wingdings" panose="05000000000000000000" pitchFamily="2" charset="2"/>
+              <a:buChar char="§"/>
+              <a:defRPr sz="1200" kern="1200" baseline="0">
+                <a:solidFill>
+                  <a:schemeClr val="tx1"/>
+                </a:solidFill>
+                <a:effectLst/>
+                <a:latin typeface="+mn-lt"/>
+                <a:ea typeface="+mn-ea"/>
+                <a:cs typeface="+mn-cs"/>
+              </a:defRPr>
+            </a:lvl9pPr>
+          </a:lstStyle>
+          <a:p>
+            <a:pPr marL="457200" lvl="1" indent="0">
+              <a:buNone/>
+            </a:pPr>
+            <a:r>
+              <a:rPr lang="en-US" dirty="0"/>
+              <a:t>8. Update graph, the unmet demands volume will be </a:t>
+            </a:r>
+            <a:r>
+              <a:rPr lang="en-US" dirty="0" err="1"/>
+              <a:t>deficiency_current</a:t>
+            </a:r>
+            <a:r>
+              <a:rPr lang="en-US" dirty="0"/>
+              <a:t>, and if it exceeds </a:t>
+            </a:r>
+            <a:r>
+              <a:rPr lang="en-US" dirty="0" err="1"/>
+              <a:t>deficiency_max</a:t>
+            </a:r>
+            <a:r>
+              <a:rPr lang="en-US" dirty="0"/>
+              <a:t>, the entity is not active anymore. The extra source volume will also go to waste.</a:t>
+            </a:r>
+          </a:p>
+        </p:txBody>
+      </p:sp>
+      <p:cxnSp>
+        <p:nvCxnSpPr>
+          <p:cNvPr id="21" name="Straight Connector 20">
+            <a:extLst>
+              <a:ext uri="{FF2B5EF4-FFF2-40B4-BE49-F238E27FC236}">
+                <a16:creationId xmlns:a16="http://schemas.microsoft.com/office/drawing/2014/main" id="{A26603F3-9DFF-2E9C-612C-3A5BC0AE5A7A}"/>
+              </a:ext>
+            </a:extLst>
+          </p:cNvPr>
+          <p:cNvCxnSpPr/>
+          <p:nvPr/>
+        </p:nvCxnSpPr>
+        <p:spPr>
+          <a:xfrm>
+            <a:off x="1410789" y="2230889"/>
+            <a:ext cx="9159350" cy="0"/>
+          </a:xfrm>
+          <a:prstGeom prst="line">
+            <a:avLst/>
+          </a:prstGeom>
+          <a:ln w="19050">
+            <a:solidFill>
+              <a:schemeClr val="bg1">
+                <a:lumMod val="50000"/>
+                <a:lumOff val="50000"/>
+              </a:schemeClr>
+            </a:solidFill>
+            <a:prstDash val="sysDot"/>
+          </a:ln>
+        </p:spPr>
+        <p:style>
+          <a:lnRef idx="1">
+            <a:schemeClr val="accent1"/>
+          </a:lnRef>
+          <a:fillRef idx="0">
+            <a:schemeClr val="accent1"/>
+          </a:fillRef>
+          <a:effectRef idx="0">
+            <a:schemeClr val="accent1"/>
+          </a:effectRef>
+          <a:fontRef idx="minor">
+            <a:schemeClr val="tx1"/>
+          </a:fontRef>
+        </p:style>
+      </p:cxnSp>
+      <p:cxnSp>
+        <p:nvCxnSpPr>
+          <p:cNvPr id="22" name="Straight Connector 21">
+            <a:extLst>
+              <a:ext uri="{FF2B5EF4-FFF2-40B4-BE49-F238E27FC236}">
+                <a16:creationId xmlns:a16="http://schemas.microsoft.com/office/drawing/2014/main" id="{0C6C147B-662B-7AF1-9F77-F62A0FA79B95}"/>
+              </a:ext>
+            </a:extLst>
+          </p:cNvPr>
+          <p:cNvCxnSpPr/>
+          <p:nvPr/>
+        </p:nvCxnSpPr>
+        <p:spPr>
+          <a:xfrm>
+            <a:off x="1410789" y="3487977"/>
+            <a:ext cx="9159350" cy="0"/>
+          </a:xfrm>
+          <a:prstGeom prst="line">
+            <a:avLst/>
+          </a:prstGeom>
+          <a:ln w="19050">
+            <a:solidFill>
+              <a:schemeClr val="bg1">
+                <a:lumMod val="50000"/>
+                <a:lumOff val="50000"/>
+              </a:schemeClr>
+            </a:solidFill>
+            <a:prstDash val="sysDot"/>
+          </a:ln>
+        </p:spPr>
+        <p:style>
+          <a:lnRef idx="1">
+            <a:schemeClr val="accent1"/>
+          </a:lnRef>
+          <a:fillRef idx="0">
+            <a:schemeClr val="accent1"/>
+          </a:fillRef>
+          <a:effectRef idx="0">
+            <a:schemeClr val="accent1"/>
+          </a:effectRef>
+          <a:fontRef idx="minor">
+            <a:schemeClr val="tx1"/>
+          </a:fontRef>
+        </p:style>
+      </p:cxnSp>
     </p:spTree>
     <p:extLst>
       <p:ext uri="{BB962C8B-B14F-4D97-AF65-F5344CB8AC3E}">
-        <p14:creationId xmlns:p14="http://schemas.microsoft.com/office/powerpoint/2010/main" val="2624085294"/>
+        <p14:creationId xmlns:p14="http://schemas.microsoft.com/office/powerpoint/2010/main" val="1527564559"/>
       </p:ext>
     </p:extLst>
   </p:cSld>
@@ -17359,6 +18736,612 @@
       </p:par>
     </p:tnLst>
   </p:timing>
+</p:sld>
+</file>
+
+<file path=ppt/slides/slide20.xml><?xml version="1.0" encoding="utf-8"?>
+<p:sld xmlns:a="http://schemas.openxmlformats.org/drawingml/2006/main" xmlns:r="http://schemas.openxmlformats.org/officeDocument/2006/relationships" xmlns:p="http://schemas.openxmlformats.org/presentationml/2006/main">
+  <p:cSld>
+    <p:spTree>
+      <p:nvGrpSpPr>
+        <p:cNvPr id="1" name=""/>
+        <p:cNvGrpSpPr/>
+        <p:nvPr/>
+      </p:nvGrpSpPr>
+      <p:grpSpPr>
+        <a:xfrm>
+          <a:off x="0" y="0"/>
+          <a:ext cx="0" cy="0"/>
+          <a:chOff x="0" y="0"/>
+          <a:chExt cx="0" cy="0"/>
+        </a:xfrm>
+      </p:grpSpPr>
+      <p:sp>
+        <p:nvSpPr>
+          <p:cNvPr id="2" name="Title 1">
+            <a:extLst>
+              <a:ext uri="{FF2B5EF4-FFF2-40B4-BE49-F238E27FC236}">
+                <a16:creationId xmlns:a16="http://schemas.microsoft.com/office/drawing/2014/main" id="{B6B9F9D5-1364-C056-CDC3-1E4760642DA4}"/>
+              </a:ext>
+            </a:extLst>
+          </p:cNvPr>
+          <p:cNvSpPr>
+            <a:spLocks noGrp="1"/>
+          </p:cNvSpPr>
+          <p:nvPr>
+            <p:ph type="title"/>
+          </p:nvPr>
+        </p:nvSpPr>
+        <p:spPr/>
+        <p:txBody>
+          <a:bodyPr/>
+          <a:lstStyle/>
+          <a:p>
+            <a:pPr algn="l"/>
+            <a:r>
+              <a:rPr lang="en-US" dirty="0"/>
+              <a:t>Steps I Took for Implementation</a:t>
+            </a:r>
+          </a:p>
+        </p:txBody>
+      </p:sp>
+      <p:sp>
+        <p:nvSpPr>
+          <p:cNvPr id="4" name="Slide Number Placeholder 3">
+            <a:extLst>
+              <a:ext uri="{FF2B5EF4-FFF2-40B4-BE49-F238E27FC236}">
+                <a16:creationId xmlns:a16="http://schemas.microsoft.com/office/drawing/2014/main" id="{0B1394F6-0184-CEED-FDBC-31E280FEEBD9}"/>
+              </a:ext>
+            </a:extLst>
+          </p:cNvPr>
+          <p:cNvSpPr>
+            <a:spLocks noGrp="1"/>
+          </p:cNvSpPr>
+          <p:nvPr>
+            <p:ph type="sldNum" sz="quarter" idx="12"/>
+          </p:nvPr>
+        </p:nvSpPr>
+        <p:spPr/>
+        <p:txBody>
+          <a:bodyPr/>
+          <a:lstStyle/>
+          <a:p>
+            <a:fld id="{A1D0E756-7835-4003-93B4-42478B879A84}" type="slidenum">
+              <a:rPr lang="en-US" smtClean="0"/>
+              <a:t>20</a:t>
+            </a:fld>
+            <a:endParaRPr lang="en-US"/>
+          </a:p>
+        </p:txBody>
+      </p:sp>
+      <p:sp>
+        <p:nvSpPr>
+          <p:cNvPr id="6" name="Content Placeholder 5">
+            <a:extLst>
+              <a:ext uri="{FF2B5EF4-FFF2-40B4-BE49-F238E27FC236}">
+                <a16:creationId xmlns:a16="http://schemas.microsoft.com/office/drawing/2014/main" id="{AE78ECED-E4CE-5F02-3612-32A693B79946}"/>
+              </a:ext>
+            </a:extLst>
+          </p:cNvPr>
+          <p:cNvSpPr>
+            <a:spLocks noGrp="1"/>
+          </p:cNvSpPr>
+          <p:nvPr>
+            <p:ph idx="1"/>
+          </p:nvPr>
+        </p:nvSpPr>
+        <p:spPr>
+          <a:xfrm>
+            <a:off x="2197730" y="2052115"/>
+            <a:ext cx="7796540" cy="4171131"/>
+          </a:xfrm>
+        </p:spPr>
+        <p:txBody>
+          <a:bodyPr>
+            <a:normAutofit/>
+          </a:bodyPr>
+          <a:lstStyle/>
+          <a:p>
+            <a:r>
+              <a:rPr lang="en-US" dirty="0"/>
+              <a:t>I’ve immigrated my implementation to </a:t>
+            </a:r>
+            <a:r>
+              <a:rPr lang="en-US" dirty="0" err="1"/>
+              <a:t>networkx</a:t>
+            </a:r>
+            <a:r>
+              <a:rPr lang="en-US" dirty="0"/>
+              <a:t>, but the Economy class is remaining.</a:t>
+            </a:r>
+          </a:p>
+          <a:p>
+            <a:r>
+              <a:rPr lang="en-US" dirty="0"/>
+              <a:t>Simple graphics using </a:t>
+            </a:r>
+            <a:r>
+              <a:rPr lang="en-US" dirty="0" err="1"/>
+              <a:t>networkx</a:t>
+            </a:r>
+            <a:r>
+              <a:rPr lang="en-US" dirty="0"/>
+              <a:t> implemented.</a:t>
+            </a:r>
+          </a:p>
+          <a:p>
+            <a:r>
+              <a:rPr lang="en-US" dirty="0"/>
+              <a:t>JSON conversion/reading for model is done.</a:t>
+            </a:r>
+          </a:p>
+          <a:p>
+            <a:endParaRPr lang="en-US" dirty="0"/>
+          </a:p>
+        </p:txBody>
+      </p:sp>
+    </p:spTree>
+    <p:extLst>
+      <p:ext uri="{BB962C8B-B14F-4D97-AF65-F5344CB8AC3E}">
+        <p14:creationId xmlns:p14="http://schemas.microsoft.com/office/powerpoint/2010/main" val="2372620920"/>
+      </p:ext>
+    </p:extLst>
+  </p:cSld>
+  <p:clrMapOvr>
+    <a:masterClrMapping/>
+  </p:clrMapOvr>
+  <mc:AlternateContent xmlns:mc="http://schemas.openxmlformats.org/markup-compatibility/2006" xmlns:p14="http://schemas.microsoft.com/office/powerpoint/2010/main">
+    <mc:Choice Requires="p14">
+      <p:transition spd="med" p14:dur="700">
+        <p:fade/>
+      </p:transition>
+    </mc:Choice>
+    <mc:Fallback xmlns="">
+      <p:transition spd="med">
+        <p:fade/>
+      </p:transition>
+    </mc:Fallback>
+  </mc:AlternateContent>
+</p:sld>
+</file>
+
+<file path=ppt/slides/slide21.xml><?xml version="1.0" encoding="utf-8"?>
+<p:sld xmlns:a="http://schemas.openxmlformats.org/drawingml/2006/main" xmlns:r="http://schemas.openxmlformats.org/officeDocument/2006/relationships" xmlns:p="http://schemas.openxmlformats.org/presentationml/2006/main">
+  <p:cSld>
+    <p:spTree>
+      <p:nvGrpSpPr>
+        <p:cNvPr id="1" name=""/>
+        <p:cNvGrpSpPr/>
+        <p:nvPr/>
+      </p:nvGrpSpPr>
+      <p:grpSpPr>
+        <a:xfrm>
+          <a:off x="0" y="0"/>
+          <a:ext cx="0" cy="0"/>
+          <a:chOff x="0" y="0"/>
+          <a:chExt cx="0" cy="0"/>
+        </a:xfrm>
+      </p:grpSpPr>
+      <p:sp>
+        <p:nvSpPr>
+          <p:cNvPr id="2" name="Title 1">
+            <a:extLst>
+              <a:ext uri="{FF2B5EF4-FFF2-40B4-BE49-F238E27FC236}">
+                <a16:creationId xmlns:a16="http://schemas.microsoft.com/office/drawing/2014/main" id="{B6B9F9D5-1364-C056-CDC3-1E4760642DA4}"/>
+              </a:ext>
+            </a:extLst>
+          </p:cNvPr>
+          <p:cNvSpPr>
+            <a:spLocks noGrp="1"/>
+          </p:cNvSpPr>
+          <p:nvPr>
+            <p:ph type="title"/>
+          </p:nvPr>
+        </p:nvSpPr>
+        <p:spPr/>
+        <p:txBody>
+          <a:bodyPr/>
+          <a:lstStyle/>
+          <a:p>
+            <a:pPr algn="l"/>
+            <a:r>
+              <a:rPr lang="en-US" dirty="0"/>
+              <a:t>Steps I Will Took for Implementation</a:t>
+            </a:r>
+          </a:p>
+        </p:txBody>
+      </p:sp>
+      <p:sp>
+        <p:nvSpPr>
+          <p:cNvPr id="4" name="Slide Number Placeholder 3">
+            <a:extLst>
+              <a:ext uri="{FF2B5EF4-FFF2-40B4-BE49-F238E27FC236}">
+                <a16:creationId xmlns:a16="http://schemas.microsoft.com/office/drawing/2014/main" id="{0B1394F6-0184-CEED-FDBC-31E280FEEBD9}"/>
+              </a:ext>
+            </a:extLst>
+          </p:cNvPr>
+          <p:cNvSpPr>
+            <a:spLocks noGrp="1"/>
+          </p:cNvSpPr>
+          <p:nvPr>
+            <p:ph type="sldNum" sz="quarter" idx="12"/>
+          </p:nvPr>
+        </p:nvSpPr>
+        <p:spPr/>
+        <p:txBody>
+          <a:bodyPr/>
+          <a:lstStyle/>
+          <a:p>
+            <a:fld id="{A1D0E756-7835-4003-93B4-42478B879A84}" type="slidenum">
+              <a:rPr lang="en-US" smtClean="0"/>
+              <a:t>21</a:t>
+            </a:fld>
+            <a:endParaRPr lang="en-US"/>
+          </a:p>
+        </p:txBody>
+      </p:sp>
+      <p:sp>
+        <p:nvSpPr>
+          <p:cNvPr id="6" name="Content Placeholder 5">
+            <a:extLst>
+              <a:ext uri="{FF2B5EF4-FFF2-40B4-BE49-F238E27FC236}">
+                <a16:creationId xmlns:a16="http://schemas.microsoft.com/office/drawing/2014/main" id="{AE78ECED-E4CE-5F02-3612-32A693B79946}"/>
+              </a:ext>
+            </a:extLst>
+          </p:cNvPr>
+          <p:cNvSpPr>
+            <a:spLocks noGrp="1"/>
+          </p:cNvSpPr>
+          <p:nvPr>
+            <p:ph idx="1"/>
+          </p:nvPr>
+        </p:nvSpPr>
+        <p:spPr>
+          <a:xfrm>
+            <a:off x="2197730" y="2052115"/>
+            <a:ext cx="7796540" cy="4171131"/>
+          </a:xfrm>
+        </p:spPr>
+        <p:txBody>
+          <a:bodyPr>
+            <a:normAutofit/>
+          </a:bodyPr>
+          <a:lstStyle/>
+          <a:p>
+            <a:r>
+              <a:rPr lang="en-US" dirty="0"/>
+              <a:t>Finishing Economy class and connecting to Model class in order to run it</a:t>
+            </a:r>
+          </a:p>
+          <a:p>
+            <a:r>
+              <a:rPr lang="en-US" dirty="0"/>
+              <a:t>Enhancing graphics</a:t>
+            </a:r>
+          </a:p>
+          <a:p>
+            <a:r>
+              <a:rPr lang="en-US" dirty="0"/>
+              <a:t>Using JSON capability to implement save/load for model</a:t>
+            </a:r>
+          </a:p>
+          <a:p>
+            <a:r>
+              <a:rPr lang="en-US" dirty="0"/>
+              <a:t>Implementing the link breakage scenarios</a:t>
+            </a:r>
+          </a:p>
+          <a:p>
+            <a:endParaRPr lang="en-US" dirty="0"/>
+          </a:p>
+        </p:txBody>
+      </p:sp>
+    </p:spTree>
+    <p:extLst>
+      <p:ext uri="{BB962C8B-B14F-4D97-AF65-F5344CB8AC3E}">
+        <p14:creationId xmlns:p14="http://schemas.microsoft.com/office/powerpoint/2010/main" val="3959935154"/>
+      </p:ext>
+    </p:extLst>
+  </p:cSld>
+  <p:clrMapOvr>
+    <a:masterClrMapping/>
+  </p:clrMapOvr>
+  <mc:AlternateContent xmlns:mc="http://schemas.openxmlformats.org/markup-compatibility/2006" xmlns:p14="http://schemas.microsoft.com/office/powerpoint/2010/main">
+    <mc:Choice Requires="p14">
+      <p:transition spd="med" p14:dur="700">
+        <p:fade/>
+      </p:transition>
+    </mc:Choice>
+    <mc:Fallback xmlns="">
+      <p:transition spd="med">
+        <p:fade/>
+      </p:transition>
+    </mc:Fallback>
+  </mc:AlternateContent>
+</p:sld>
+</file>
+
+<file path=ppt/slides/slide22.xml><?xml version="1.0" encoding="utf-8"?>
+<p:sld xmlns:a="http://schemas.openxmlformats.org/drawingml/2006/main" xmlns:r="http://schemas.openxmlformats.org/officeDocument/2006/relationships" xmlns:p="http://schemas.openxmlformats.org/presentationml/2006/main">
+  <p:cSld>
+    <p:spTree>
+      <p:nvGrpSpPr>
+        <p:cNvPr id="1" name=""/>
+        <p:cNvGrpSpPr/>
+        <p:nvPr/>
+      </p:nvGrpSpPr>
+      <p:grpSpPr>
+        <a:xfrm>
+          <a:off x="0" y="0"/>
+          <a:ext cx="0" cy="0"/>
+          <a:chOff x="0" y="0"/>
+          <a:chExt cx="0" cy="0"/>
+        </a:xfrm>
+      </p:grpSpPr>
+      <p:sp>
+        <p:nvSpPr>
+          <p:cNvPr id="2" name="Title 1">
+            <a:extLst>
+              <a:ext uri="{FF2B5EF4-FFF2-40B4-BE49-F238E27FC236}">
+                <a16:creationId xmlns:a16="http://schemas.microsoft.com/office/drawing/2014/main" id="{B6B9F9D5-1364-C056-CDC3-1E4760642DA4}"/>
+              </a:ext>
+            </a:extLst>
+          </p:cNvPr>
+          <p:cNvSpPr>
+            <a:spLocks noGrp="1"/>
+          </p:cNvSpPr>
+          <p:nvPr>
+            <p:ph type="title"/>
+          </p:nvPr>
+        </p:nvSpPr>
+        <p:spPr/>
+        <p:txBody>
+          <a:bodyPr/>
+          <a:lstStyle/>
+          <a:p>
+            <a:pPr algn="l"/>
+            <a:r>
+              <a:rPr lang="en-US" dirty="0"/>
+              <a:t>Comments on My Approach</a:t>
+            </a:r>
+          </a:p>
+        </p:txBody>
+      </p:sp>
+      <p:sp>
+        <p:nvSpPr>
+          <p:cNvPr id="4" name="Slide Number Placeholder 3">
+            <a:extLst>
+              <a:ext uri="{FF2B5EF4-FFF2-40B4-BE49-F238E27FC236}">
+                <a16:creationId xmlns:a16="http://schemas.microsoft.com/office/drawing/2014/main" id="{0B1394F6-0184-CEED-FDBC-31E280FEEBD9}"/>
+              </a:ext>
+            </a:extLst>
+          </p:cNvPr>
+          <p:cNvSpPr>
+            <a:spLocks noGrp="1"/>
+          </p:cNvSpPr>
+          <p:nvPr>
+            <p:ph type="sldNum" sz="quarter" idx="12"/>
+          </p:nvPr>
+        </p:nvSpPr>
+        <p:spPr/>
+        <p:txBody>
+          <a:bodyPr/>
+          <a:lstStyle/>
+          <a:p>
+            <a:fld id="{A1D0E756-7835-4003-93B4-42478B879A84}" type="slidenum">
+              <a:rPr lang="en-US" smtClean="0"/>
+              <a:t>22</a:t>
+            </a:fld>
+            <a:endParaRPr lang="en-US"/>
+          </a:p>
+        </p:txBody>
+      </p:sp>
+      <p:sp>
+        <p:nvSpPr>
+          <p:cNvPr id="6" name="Content Placeholder 5">
+            <a:extLst>
+              <a:ext uri="{FF2B5EF4-FFF2-40B4-BE49-F238E27FC236}">
+                <a16:creationId xmlns:a16="http://schemas.microsoft.com/office/drawing/2014/main" id="{AE78ECED-E4CE-5F02-3612-32A693B79946}"/>
+              </a:ext>
+            </a:extLst>
+          </p:cNvPr>
+          <p:cNvSpPr>
+            <a:spLocks noGrp="1"/>
+          </p:cNvSpPr>
+          <p:nvPr>
+            <p:ph idx="1"/>
+          </p:nvPr>
+        </p:nvSpPr>
+        <p:spPr>
+          <a:xfrm>
+            <a:off x="2197730" y="2052116"/>
+            <a:ext cx="7796540" cy="4135620"/>
+          </a:xfrm>
+        </p:spPr>
+        <p:txBody>
+          <a:bodyPr>
+            <a:normAutofit/>
+          </a:bodyPr>
+          <a:lstStyle/>
+          <a:p>
+            <a:r>
+              <a:rPr lang="en-US" dirty="0"/>
+              <a:t>Neglecting edge type 4 (from “</a:t>
+            </a:r>
+            <a:r>
+              <a:rPr lang="en-US" dirty="0">
+                <a:solidFill>
+                  <a:schemeClr val="tx2">
+                    <a:lumMod val="50000"/>
+                  </a:schemeClr>
+                </a:solidFill>
+              </a:rPr>
+              <a:t>storage</a:t>
+            </a:r>
+            <a:r>
+              <a:rPr lang="en-US" dirty="0"/>
+              <a:t>” to “</a:t>
+            </a:r>
+            <a:r>
+              <a:rPr lang="en-US" dirty="0">
+                <a:solidFill>
+                  <a:schemeClr val="tx2">
+                    <a:lumMod val="50000"/>
+                  </a:schemeClr>
+                </a:solidFill>
+              </a:rPr>
+              <a:t>storage</a:t>
+            </a:r>
+            <a:r>
+              <a:rPr lang="en-US" dirty="0"/>
+              <a:t>”)</a:t>
+            </a:r>
+          </a:p>
+          <a:p>
+            <a:r>
+              <a:rPr lang="en-US" dirty="0"/>
+              <a:t>The way of choosing the best fit for transaction during economic calculations seems spooky.</a:t>
+            </a:r>
+          </a:p>
+          <a:p>
+            <a:r>
+              <a:rPr lang="en-US" dirty="0"/>
+              <a:t>Probably, I relied too much on implementing from scratch.</a:t>
+            </a:r>
+          </a:p>
+          <a:p>
+            <a:endParaRPr lang="en-US" dirty="0"/>
+          </a:p>
+        </p:txBody>
+      </p:sp>
+    </p:spTree>
+    <p:extLst>
+      <p:ext uri="{BB962C8B-B14F-4D97-AF65-F5344CB8AC3E}">
+        <p14:creationId xmlns:p14="http://schemas.microsoft.com/office/powerpoint/2010/main" val="2624085294"/>
+      </p:ext>
+    </p:extLst>
+  </p:cSld>
+  <p:clrMapOvr>
+    <a:masterClrMapping/>
+  </p:clrMapOvr>
+  <mc:AlternateContent xmlns:mc="http://schemas.openxmlformats.org/markup-compatibility/2006" xmlns:p14="http://schemas.microsoft.com/office/powerpoint/2010/main">
+    <mc:Choice Requires="p14">
+      <p:transition spd="med" p14:dur="700">
+        <p:fade/>
+      </p:transition>
+    </mc:Choice>
+    <mc:Fallback xmlns="">
+      <p:transition spd="med">
+        <p:fade/>
+      </p:transition>
+    </mc:Fallback>
+  </mc:AlternateContent>
+</p:sld>
+</file>
+
+<file path=ppt/slides/slide23.xml><?xml version="1.0" encoding="utf-8"?>
+<p:sld xmlns:a="http://schemas.openxmlformats.org/drawingml/2006/main" xmlns:r="http://schemas.openxmlformats.org/officeDocument/2006/relationships" xmlns:p="http://schemas.openxmlformats.org/presentationml/2006/main">
+  <p:cSld>
+    <p:spTree>
+      <p:nvGrpSpPr>
+        <p:cNvPr id="1" name=""/>
+        <p:cNvGrpSpPr/>
+        <p:nvPr/>
+      </p:nvGrpSpPr>
+      <p:grpSpPr>
+        <a:xfrm>
+          <a:off x="0" y="0"/>
+          <a:ext cx="0" cy="0"/>
+          <a:chOff x="0" y="0"/>
+          <a:chExt cx="0" cy="0"/>
+        </a:xfrm>
+      </p:grpSpPr>
+      <p:sp>
+        <p:nvSpPr>
+          <p:cNvPr id="2" name="Title 1">
+            <a:extLst>
+              <a:ext uri="{FF2B5EF4-FFF2-40B4-BE49-F238E27FC236}">
+                <a16:creationId xmlns:a16="http://schemas.microsoft.com/office/drawing/2014/main" id="{5626438E-D767-1B34-9FE1-FB95F48B322D}"/>
+              </a:ext>
+            </a:extLst>
+          </p:cNvPr>
+          <p:cNvSpPr>
+            <a:spLocks noGrp="1"/>
+          </p:cNvSpPr>
+          <p:nvPr>
+            <p:ph type="ctrTitle"/>
+          </p:nvPr>
+        </p:nvSpPr>
+        <p:spPr>
+          <a:xfrm>
+            <a:off x="1864311" y="2690161"/>
+            <a:ext cx="6114643" cy="2268559"/>
+          </a:xfrm>
+        </p:spPr>
+        <p:txBody>
+          <a:bodyPr/>
+          <a:lstStyle/>
+          <a:p>
+            <a:pPr algn="ctr"/>
+            <a:r>
+              <a:rPr lang="en-US" dirty="0"/>
+              <a:t>Thank you for you patience</a:t>
+            </a:r>
+          </a:p>
+        </p:txBody>
+      </p:sp>
+      <p:sp>
+        <p:nvSpPr>
+          <p:cNvPr id="5" name="Subtitle 4">
+            <a:extLst>
+              <a:ext uri="{FF2B5EF4-FFF2-40B4-BE49-F238E27FC236}">
+                <a16:creationId xmlns:a16="http://schemas.microsoft.com/office/drawing/2014/main" id="{C845495E-BD07-3FA1-2CC8-2E553BF4D6A2}"/>
+              </a:ext>
+            </a:extLst>
+          </p:cNvPr>
+          <p:cNvSpPr>
+            <a:spLocks noGrp="1"/>
+          </p:cNvSpPr>
+          <p:nvPr>
+            <p:ph type="subTitle" idx="1"/>
+          </p:nvPr>
+        </p:nvSpPr>
+        <p:spPr>
+          <a:xfrm>
+            <a:off x="2772274" y="4958720"/>
+            <a:ext cx="5357600" cy="1160213"/>
+          </a:xfrm>
+        </p:spPr>
+        <p:txBody>
+          <a:bodyPr/>
+          <a:lstStyle/>
+          <a:p>
+            <a:endParaRPr lang="en-US"/>
+          </a:p>
+        </p:txBody>
+      </p:sp>
+    </p:spTree>
+    <p:extLst>
+      <p:ext uri="{BB962C8B-B14F-4D97-AF65-F5344CB8AC3E}">
+        <p14:creationId xmlns:p14="http://schemas.microsoft.com/office/powerpoint/2010/main" val="2663144107"/>
+      </p:ext>
+    </p:extLst>
+  </p:cSld>
+  <p:clrMapOvr>
+    <a:masterClrMapping/>
+  </p:clrMapOvr>
+  <mc:AlternateContent xmlns:mc="http://schemas.openxmlformats.org/markup-compatibility/2006" xmlns:p14="http://schemas.microsoft.com/office/powerpoint/2010/main">
+    <mc:Choice Requires="p14">
+      <p:transition spd="med" p14:dur="700">
+        <p:fade/>
+      </p:transition>
+    </mc:Choice>
+    <mc:Fallback xmlns="">
+      <p:transition spd="med">
+        <p:fade/>
+      </p:transition>
+    </mc:Fallback>
+  </mc:AlternateContent>
 </p:sld>
 </file>
 
@@ -19058,7 +21041,7 @@
         </p:nvSpPr>
         <p:spPr>
           <a:xfrm>
-            <a:off x="1831021" y="1565688"/>
+            <a:off x="1831021" y="2672187"/>
             <a:ext cx="3735280" cy="3139321"/>
           </a:xfrm>
           <a:prstGeom prst="rect">
@@ -19850,7 +21833,7 @@
         </p:nvSpPr>
         <p:spPr>
           <a:xfrm>
-            <a:off x="1831021" y="4705009"/>
+            <a:off x="1831020" y="1702175"/>
             <a:ext cx="3229251" cy="1107996"/>
           </a:xfrm>
           <a:prstGeom prst="rect">
@@ -20118,7 +22101,7 @@
         </p:nvSpPr>
         <p:spPr>
           <a:xfrm>
-            <a:off x="6679750" y="1565688"/>
+            <a:off x="6625700" y="2672187"/>
             <a:ext cx="3318029" cy="3139321"/>
           </a:xfrm>
           <a:prstGeom prst="rect">
@@ -20910,7 +22893,7 @@
         </p:nvSpPr>
         <p:spPr>
           <a:xfrm>
-            <a:off x="6679750" y="4705009"/>
+            <a:off x="6625700" y="1702175"/>
             <a:ext cx="2767614" cy="938719"/>
           </a:xfrm>
           <a:prstGeom prst="rect">
@@ -21171,7 +23154,7 @@
         </p:nvCxnSpPr>
         <p:spPr>
           <a:xfrm>
-            <a:off x="5566301" y="1707732"/>
+            <a:off x="5566301" y="1766455"/>
             <a:ext cx="0" cy="3849690"/>
           </a:xfrm>
           <a:prstGeom prst="line">
@@ -21393,7 +23376,7 @@
                                           </p:stCondLst>
                                         </p:cTn>
                                         <p:tgtEl>
-                                          <p:spTgt spid="9"/>
+                                          <p:spTgt spid="11"/>
                                         </p:tgtEl>
                                         <p:attrNameLst>
                                           <p:attrName>style.visibility</p:attrName>
@@ -21407,7 +23390,7 @@
                                       <p:cBhvr>
                                         <p:cTn id="7" dur="500"/>
                                         <p:tgtEl>
-                                          <p:spTgt spid="9"/>
+                                          <p:spTgt spid="11"/>
                                         </p:tgtEl>
                                       </p:cBhvr>
                                     </p:animEffect>
@@ -21446,7 +23429,7 @@
                                           </p:stCondLst>
                                         </p:cTn>
                                         <p:tgtEl>
-                                          <p:spTgt spid="11"/>
+                                          <p:spTgt spid="9"/>
                                         </p:tgtEl>
                                         <p:attrNameLst>
                                           <p:attrName>style.visibility</p:attrName>
@@ -21460,7 +23443,7 @@
                                       <p:cBhvr>
                                         <p:cTn id="12" dur="500"/>
                                         <p:tgtEl>
-                                          <p:spTgt spid="11"/>
+                                          <p:spTgt spid="9"/>
                                         </p:tgtEl>
                                       </p:cBhvr>
                                     </p:animEffect>
@@ -21499,7 +23482,7 @@
                                           </p:stCondLst>
                                         </p:cTn>
                                         <p:tgtEl>
-                                          <p:spTgt spid="13"/>
+                                          <p:spTgt spid="15"/>
                                         </p:tgtEl>
                                         <p:attrNameLst>
                                           <p:attrName>style.visibility</p:attrName>
@@ -21513,7 +23496,7 @@
                                       <p:cBhvr>
                                         <p:cTn id="17" dur="500"/>
                                         <p:tgtEl>
-                                          <p:spTgt spid="13"/>
+                                          <p:spTgt spid="15"/>
                                         </p:tgtEl>
                                       </p:cBhvr>
                                     </p:animEffect>
@@ -21587,7 +23570,7 @@
                                           </p:stCondLst>
                                         </p:cTn>
                                         <p:tgtEl>
-                                          <p:spTgt spid="15"/>
+                                          <p:spTgt spid="13"/>
                                         </p:tgtEl>
                                         <p:attrNameLst>
                                           <p:attrName>style.visibility</p:attrName>
@@ -21601,7 +23584,7 @@
                                       <p:cBhvr>
                                         <p:cTn id="25" dur="500"/>
                                         <p:tgtEl>
-                                          <p:spTgt spid="15"/>
+                                          <p:spTgt spid="13"/>
                                         </p:tgtEl>
                                       </p:cBhvr>
                                     </p:animEffect>

</xml_diff>